<commit_message>
Added note for PE1
</commit_message>
<xml_diff>
--- a/Tutorial_10/CS1010_TutC09_10.pptx
+++ b/Tutorial_10/CS1010_TutC09_10.pptx
@@ -1050,6 +1050,34 @@
           <a:bodyPr/>
           <a:lstStyle/>
           <a:p>
+            <a:pPr marL="171450" indent="-171450">
+              <a:buFontTx/>
+              <a:buChar char="-"/>
+            </a:pPr>
+            <a:r>
+              <a:rPr lang="en-US" dirty="0"/>
+              <a:t>Fail to consider if x is already the root</a:t>
+            </a:r>
+          </a:p>
+          <a:p>
+            <a:pPr marL="171450" indent="-171450">
+              <a:buFontTx/>
+              <a:buChar char="-"/>
+            </a:pPr>
+            <a:r>
+              <a:rPr lang="en-US" dirty="0"/>
+              <a:t>Using the wrong type (long instead of double, float instead of double</a:t>
+            </a:r>
+          </a:p>
+          <a:p>
+            <a:pPr marL="171450" indent="-171450">
+              <a:buFontTx/>
+              <a:buChar char="-"/>
+            </a:pPr>
+            <a:r>
+              <a:rPr lang="en-US" dirty="0"/>
+              <a:t>Wrong terminating conditions (did not take `fabs`, use `&gt;` instead of `&lt;`, comparing with 0.001 instead of 0.000000001, terminating after 4 times, etc.)</a:t>
+            </a:r>
             <a:endParaRPr lang="en-SG" dirty="0"/>
           </a:p>
         </p:txBody>

</xml_diff>